<commit_message>
what we actually presented
</commit_message>
<xml_diff>
--- a/lectures/day1-intro.pptx
+++ b/lectures/day1-intro.pptx
@@ -5,7 +5,7 @@
     <p:sldMasterId id="2147483648" r:id="rId1"/>
   </p:sldMasterIdLst>
   <p:notesMasterIdLst>
-    <p:notesMasterId r:id="rId22"/>
+    <p:notesMasterId r:id="rId23"/>
   </p:notesMasterIdLst>
   <p:sldIdLst>
     <p:sldId id="256" r:id="rId2"/>
@@ -19,15 +19,16 @@
     <p:sldId id="275" r:id="rId10"/>
     <p:sldId id="273" r:id="rId11"/>
     <p:sldId id="274" r:id="rId12"/>
-    <p:sldId id="272" r:id="rId13"/>
-    <p:sldId id="276" r:id="rId14"/>
-    <p:sldId id="277" r:id="rId15"/>
-    <p:sldId id="262" r:id="rId16"/>
-    <p:sldId id="263" r:id="rId17"/>
-    <p:sldId id="264" r:id="rId18"/>
-    <p:sldId id="265" r:id="rId19"/>
-    <p:sldId id="266" r:id="rId20"/>
-    <p:sldId id="267" r:id="rId21"/>
+    <p:sldId id="279" r:id="rId13"/>
+    <p:sldId id="272" r:id="rId14"/>
+    <p:sldId id="276" r:id="rId15"/>
+    <p:sldId id="277" r:id="rId16"/>
+    <p:sldId id="262" r:id="rId17"/>
+    <p:sldId id="263" r:id="rId18"/>
+    <p:sldId id="264" r:id="rId19"/>
+    <p:sldId id="265" r:id="rId20"/>
+    <p:sldId id="266" r:id="rId21"/>
+    <p:sldId id="267" r:id="rId22"/>
   </p:sldIdLst>
   <p:sldSz cx="9144000" cy="6858000" type="screen4x3"/>
   <p:notesSz cx="6858000" cy="9144000"/>
@@ -211,7 +212,7 @@
           <a:p>
             <a:fld id="{973C8552-4635-E645-9B2C-86428A645CB1}" type="datetimeFigureOut">
               <a:rPr lang="en-US" smtClean="0"/>
-              <a:t>1/8/12</a:t>
+              <a:t>1/9/12</a:t>
             </a:fld>
             <a:endParaRPr lang="en-US"/>
           </a:p>
@@ -796,7 +797,7 @@
           <a:p>
             <a:fld id="{4337C64D-08AD-5443-A64F-675CD4FBC947}" type="slidenum">
               <a:rPr lang="en-US" smtClean="0"/>
-              <a:t>18</a:t>
+              <a:t>19</a:t>
             </a:fld>
             <a:endParaRPr lang="en-US"/>
           </a:p>
@@ -996,7 +997,7 @@
           <a:p>
             <a:fld id="{D4FD3536-E56C-3B45-804E-B9437F4EFC43}" type="datetimeFigureOut">
               <a:rPr lang="en-US" smtClean="0"/>
-              <a:t>1/8/12</a:t>
+              <a:t>1/9/12</a:t>
             </a:fld>
             <a:endParaRPr lang="en-US"/>
           </a:p>
@@ -1166,7 +1167,7 @@
           <a:p>
             <a:fld id="{D4FD3536-E56C-3B45-804E-B9437F4EFC43}" type="datetimeFigureOut">
               <a:rPr lang="en-US" smtClean="0"/>
-              <a:t>1/8/12</a:t>
+              <a:t>1/9/12</a:t>
             </a:fld>
             <a:endParaRPr lang="en-US"/>
           </a:p>
@@ -1346,7 +1347,7 @@
           <a:p>
             <a:fld id="{D4FD3536-E56C-3B45-804E-B9437F4EFC43}" type="datetimeFigureOut">
               <a:rPr lang="en-US" smtClean="0"/>
-              <a:t>1/8/12</a:t>
+              <a:t>1/9/12</a:t>
             </a:fld>
             <a:endParaRPr lang="en-US"/>
           </a:p>
@@ -1516,7 +1517,7 @@
           <a:p>
             <a:fld id="{D4FD3536-E56C-3B45-804E-B9437F4EFC43}" type="datetimeFigureOut">
               <a:rPr lang="en-US" smtClean="0"/>
-              <a:t>1/8/12</a:t>
+              <a:t>1/9/12</a:t>
             </a:fld>
             <a:endParaRPr lang="en-US"/>
           </a:p>
@@ -1762,7 +1763,7 @@
           <a:p>
             <a:fld id="{D4FD3536-E56C-3B45-804E-B9437F4EFC43}" type="datetimeFigureOut">
               <a:rPr lang="en-US" smtClean="0"/>
-              <a:t>1/8/12</a:t>
+              <a:t>1/9/12</a:t>
             </a:fld>
             <a:endParaRPr lang="en-US"/>
           </a:p>
@@ -2050,7 +2051,7 @@
           <a:p>
             <a:fld id="{D4FD3536-E56C-3B45-804E-B9437F4EFC43}" type="datetimeFigureOut">
               <a:rPr lang="en-US" smtClean="0"/>
-              <a:t>1/8/12</a:t>
+              <a:t>1/9/12</a:t>
             </a:fld>
             <a:endParaRPr lang="en-US"/>
           </a:p>
@@ -2472,7 +2473,7 @@
           <a:p>
             <a:fld id="{D4FD3536-E56C-3B45-804E-B9437F4EFC43}" type="datetimeFigureOut">
               <a:rPr lang="en-US" smtClean="0"/>
-              <a:t>1/8/12</a:t>
+              <a:t>1/9/12</a:t>
             </a:fld>
             <a:endParaRPr lang="en-US"/>
           </a:p>
@@ -2590,7 +2591,7 @@
           <a:p>
             <a:fld id="{D4FD3536-E56C-3B45-804E-B9437F4EFC43}" type="datetimeFigureOut">
               <a:rPr lang="en-US" smtClean="0"/>
-              <a:t>1/8/12</a:t>
+              <a:t>1/9/12</a:t>
             </a:fld>
             <a:endParaRPr lang="en-US"/>
           </a:p>
@@ -2685,7 +2686,7 @@
           <a:p>
             <a:fld id="{D4FD3536-E56C-3B45-804E-B9437F4EFC43}" type="datetimeFigureOut">
               <a:rPr lang="en-US" smtClean="0"/>
-              <a:t>1/8/12</a:t>
+              <a:t>1/9/12</a:t>
             </a:fld>
             <a:endParaRPr lang="en-US"/>
           </a:p>
@@ -2962,7 +2963,7 @@
           <a:p>
             <a:fld id="{D4FD3536-E56C-3B45-804E-B9437F4EFC43}" type="datetimeFigureOut">
               <a:rPr lang="en-US" smtClean="0"/>
-              <a:t>1/8/12</a:t>
+              <a:t>1/9/12</a:t>
             </a:fld>
             <a:endParaRPr lang="en-US"/>
           </a:p>
@@ -3215,7 +3216,7 @@
           <a:p>
             <a:fld id="{D4FD3536-E56C-3B45-804E-B9437F4EFC43}" type="datetimeFigureOut">
               <a:rPr lang="en-US" smtClean="0"/>
-              <a:t>1/8/12</a:t>
+              <a:t>1/9/12</a:t>
             </a:fld>
             <a:endParaRPr lang="en-US"/>
           </a:p>
@@ -3428,7 +3429,7 @@
           <a:p>
             <a:fld id="{D4FD3536-E56C-3B45-804E-B9437F4EFC43}" type="datetimeFigureOut">
               <a:rPr lang="en-US" smtClean="0"/>
-              <a:t>1/8/12</a:t>
+              <a:t>1/9/12</a:t>
             </a:fld>
             <a:endParaRPr lang="en-US"/>
           </a:p>
@@ -4027,7 +4028,7 @@
       </p:grpSpPr>
       <p:pic>
         <p:nvPicPr>
-          <p:cNvPr id="4" name="Picture 3"/>
+          <p:cNvPr id="5" name="Picture 4"/>
           <p:cNvPicPr>
             <a:picLocks noChangeAspect="1"/>
           </p:cNvPicPr>
@@ -4035,30 +4036,6 @@
         </p:nvPicPr>
         <p:blipFill>
           <a:blip r:embed="rId2"/>
-          <a:stretch>
-            <a:fillRect/>
-          </a:stretch>
-        </p:blipFill>
-        <p:spPr>
-          <a:xfrm>
-            <a:off x="1240255" y="2188314"/>
-            <a:ext cx="6679268" cy="3756475"/>
-          </a:xfrm>
-          <a:prstGeom prst="rect">
-            <a:avLst/>
-          </a:prstGeom>
-        </p:spPr>
-      </p:pic>
-      <p:pic>
-        <p:nvPicPr>
-          <p:cNvPr id="5" name="Picture 4"/>
-          <p:cNvPicPr>
-            <a:picLocks noChangeAspect="1"/>
-          </p:cNvPicPr>
-          <p:nvPr/>
-        </p:nvPicPr>
-        <p:blipFill>
-          <a:blip r:embed="rId3"/>
           <a:stretch>
             <a:fillRect/>
           </a:stretch>
@@ -4094,6 +4071,67 @@
 </file>
 
 <file path=ppt/slides/slide12.xml><?xml version="1.0" encoding="utf-8"?>
+<p:sld xmlns:a="http://schemas.openxmlformats.org/drawingml/2006/main" xmlns:r="http://schemas.openxmlformats.org/officeDocument/2006/relationships" xmlns:p="http://schemas.openxmlformats.org/presentationml/2006/main">
+  <p:cSld>
+    <p:spTree>
+      <p:nvGrpSpPr>
+        <p:cNvPr id="1" name=""/>
+        <p:cNvGrpSpPr/>
+        <p:nvPr/>
+      </p:nvGrpSpPr>
+      <p:grpSpPr>
+        <a:xfrm>
+          <a:off x="0" y="0"/>
+          <a:ext cx="0" cy="0"/>
+          <a:chOff x="0" y="0"/>
+          <a:chExt cx="0" cy="0"/>
+        </a:xfrm>
+      </p:grpSpPr>
+      <p:pic>
+        <p:nvPicPr>
+          <p:cNvPr id="4" name="Picture 3"/>
+          <p:cNvPicPr>
+            <a:picLocks noChangeAspect="1"/>
+          </p:cNvPicPr>
+          <p:nvPr/>
+        </p:nvPicPr>
+        <p:blipFill>
+          <a:blip r:embed="rId2"/>
+          <a:stretch>
+            <a:fillRect/>
+          </a:stretch>
+        </p:blipFill>
+        <p:spPr>
+          <a:xfrm>
+            <a:off x="1240255" y="2188314"/>
+            <a:ext cx="6679268" cy="3756475"/>
+          </a:xfrm>
+          <a:prstGeom prst="rect">
+            <a:avLst/>
+          </a:prstGeom>
+        </p:spPr>
+      </p:pic>
+    </p:spTree>
+    <p:extLst>
+      <p:ext uri="{BB962C8B-B14F-4D97-AF65-F5344CB8AC3E}">
+        <p14:creationId xmlns:p14="http://schemas.microsoft.com/office/powerpoint/2010/main" val="3482609128"/>
+      </p:ext>
+    </p:extLst>
+  </p:cSld>
+  <p:clrMapOvr>
+    <a:masterClrMapping/>
+  </p:clrMapOvr>
+  <p:timing>
+    <p:tnLst>
+      <p:par>
+        <p:cTn xmlns:p14="http://schemas.microsoft.com/office/powerpoint/2010/main" id="1" dur="indefinite" restart="never" nodeType="tmRoot"/>
+      </p:par>
+    </p:tnLst>
+  </p:timing>
+</p:sld>
+</file>
+
+<file path=ppt/slides/slide13.xml><?xml version="1.0" encoding="utf-8"?>
 <p:sld xmlns:a="http://schemas.openxmlformats.org/drawingml/2006/main" xmlns:r="http://schemas.openxmlformats.org/officeDocument/2006/relationships" xmlns:p="http://schemas.openxmlformats.org/presentationml/2006/main">
   <p:cSld>
     <p:spTree>
@@ -4298,7 +4336,7 @@
 </p:sld>
 </file>
 
-<file path=ppt/slides/slide13.xml><?xml version="1.0" encoding="utf-8"?>
+<file path=ppt/slides/slide14.xml><?xml version="1.0" encoding="utf-8"?>
 <p:sld xmlns:a="http://schemas.openxmlformats.org/drawingml/2006/main" xmlns:r="http://schemas.openxmlformats.org/officeDocument/2006/relationships" xmlns:p="http://schemas.openxmlformats.org/presentationml/2006/main">
   <p:cSld>
     <p:spTree>
@@ -4365,7 +4403,7 @@
 </p:sld>
 </file>
 
-<file path=ppt/slides/slide14.xml><?xml version="1.0" encoding="utf-8"?>
+<file path=ppt/slides/slide15.xml><?xml version="1.0" encoding="utf-8"?>
 <p:sld xmlns:a="http://schemas.openxmlformats.org/drawingml/2006/main" xmlns:r="http://schemas.openxmlformats.org/officeDocument/2006/relationships" xmlns:p="http://schemas.openxmlformats.org/presentationml/2006/main">
   <p:cSld>
     <p:spTree>
@@ -4454,7 +4492,7 @@
 </p:sld>
 </file>
 
-<file path=ppt/slides/slide15.xml><?xml version="1.0" encoding="utf-8"?>
+<file path=ppt/slides/slide16.xml><?xml version="1.0" encoding="utf-8"?>
 <p:sld xmlns:a="http://schemas.openxmlformats.org/drawingml/2006/main" xmlns:r="http://schemas.openxmlformats.org/officeDocument/2006/relationships" xmlns:p="http://schemas.openxmlformats.org/presentationml/2006/main">
   <p:cSld>
     <p:spTree>
@@ -4537,7 +4575,7 @@
 </p:sld>
 </file>
 
-<file path=ppt/slides/slide16.xml><?xml version="1.0" encoding="utf-8"?>
+<file path=ppt/slides/slide17.xml><?xml version="1.0" encoding="utf-8"?>
 <p:sld xmlns:a="http://schemas.openxmlformats.org/drawingml/2006/main" xmlns:r="http://schemas.openxmlformats.org/officeDocument/2006/relationships" xmlns:p="http://schemas.openxmlformats.org/presentationml/2006/main">
   <p:cSld>
     <p:spTree>
@@ -4620,7 +4658,7 @@
 </p:sld>
 </file>
 
-<file path=ppt/slides/slide17.xml><?xml version="1.0" encoding="utf-8"?>
+<file path=ppt/slides/slide18.xml><?xml version="1.0" encoding="utf-8"?>
 <p:sld xmlns:a="http://schemas.openxmlformats.org/drawingml/2006/main" xmlns:r="http://schemas.openxmlformats.org/officeDocument/2006/relationships" xmlns:p="http://schemas.openxmlformats.org/presentationml/2006/main">
   <p:cSld>
     <p:spTree>
@@ -4703,7 +4741,7 @@
 </p:sld>
 </file>
 
-<file path=ppt/slides/slide18.xml><?xml version="1.0" encoding="utf-8"?>
+<file path=ppt/slides/slide19.xml><?xml version="1.0" encoding="utf-8"?>
 <p:sld xmlns:a="http://schemas.openxmlformats.org/drawingml/2006/main" xmlns:r="http://schemas.openxmlformats.org/officeDocument/2006/relationships" xmlns:p="http://schemas.openxmlformats.org/presentationml/2006/main">
   <p:cSld>
     <p:spTree>
@@ -4788,7 +4826,107 @@
 </p:sld>
 </file>
 
-<file path=ppt/slides/slide19.xml><?xml version="1.0" encoding="utf-8"?>
+<file path=ppt/slides/slide2.xml><?xml version="1.0" encoding="utf-8"?>
+<p:sld xmlns:a="http://schemas.openxmlformats.org/drawingml/2006/main" xmlns:r="http://schemas.openxmlformats.org/officeDocument/2006/relationships" xmlns:p="http://schemas.openxmlformats.org/presentationml/2006/main">
+  <p:cSld>
+    <p:spTree>
+      <p:nvGrpSpPr>
+        <p:cNvPr id="1" name=""/>
+        <p:cNvGrpSpPr/>
+        <p:nvPr/>
+      </p:nvGrpSpPr>
+      <p:grpSpPr>
+        <a:xfrm>
+          <a:off x="0" y="0"/>
+          <a:ext cx="0" cy="0"/>
+          <a:chOff x="0" y="0"/>
+          <a:chExt cx="0" cy="0"/>
+        </a:xfrm>
+      </p:grpSpPr>
+      <p:sp>
+        <p:nvSpPr>
+          <p:cNvPr id="2" name="Title 1"/>
+          <p:cNvSpPr>
+            <a:spLocks noGrp="1"/>
+          </p:cNvSpPr>
+          <p:nvPr>
+            <p:ph type="title"/>
+          </p:nvPr>
+        </p:nvSpPr>
+        <p:spPr/>
+        <p:txBody>
+          <a:bodyPr/>
+          <a:lstStyle/>
+          <a:p>
+            <a:r>
+              <a:rPr lang="en-US" dirty="0" smtClean="0"/>
+              <a:t>Course Basics</a:t>
+            </a:r>
+            <a:endParaRPr lang="en-US" dirty="0"/>
+          </a:p>
+        </p:txBody>
+      </p:sp>
+      <p:sp>
+        <p:nvSpPr>
+          <p:cNvPr id="3" name="Content Placeholder 2"/>
+          <p:cNvSpPr>
+            <a:spLocks noGrp="1"/>
+          </p:cNvSpPr>
+          <p:nvPr>
+            <p:ph idx="1"/>
+          </p:nvPr>
+        </p:nvSpPr>
+        <p:spPr/>
+        <p:txBody>
+          <a:bodyPr/>
+          <a:lstStyle/>
+          <a:p>
+            <a:r>
+              <a:rPr lang="en-US" dirty="0" smtClean="0"/>
+              <a:t>5 lab days: ~30min background, 2.5h lab</a:t>
+            </a:r>
+          </a:p>
+          <a:p>
+            <a:r>
+              <a:rPr lang="en-US" dirty="0" smtClean="0"/>
+              <a:t>1 presentation madness day</a:t>
+            </a:r>
+          </a:p>
+          <a:p>
+            <a:r>
+              <a:rPr lang="en-US" dirty="0" smtClean="0"/>
+              <a:t>No grades</a:t>
+            </a:r>
+          </a:p>
+          <a:p>
+            <a:r>
+              <a:rPr lang="en-US" dirty="0" smtClean="0"/>
+              <a:t>No homework, unless you don’t finish lab</a:t>
+            </a:r>
+          </a:p>
+        </p:txBody>
+      </p:sp>
+    </p:spTree>
+    <p:extLst>
+      <p:ext uri="{BB962C8B-B14F-4D97-AF65-F5344CB8AC3E}">
+        <p14:creationId xmlns:p14="http://schemas.microsoft.com/office/powerpoint/2010/main" val="2589989488"/>
+      </p:ext>
+    </p:extLst>
+  </p:cSld>
+  <p:clrMapOvr>
+    <a:masterClrMapping/>
+  </p:clrMapOvr>
+  <p:timing>
+    <p:tnLst>
+      <p:par>
+        <p:cTn xmlns:p14="http://schemas.microsoft.com/office/powerpoint/2010/main" id="1" dur="indefinite" restart="never" nodeType="tmRoot"/>
+      </p:par>
+    </p:tnLst>
+  </p:timing>
+</p:sld>
+</file>
+
+<file path=ppt/slides/slide20.xml><?xml version="1.0" encoding="utf-8"?>
 <p:sld xmlns:a="http://schemas.openxmlformats.org/drawingml/2006/main" xmlns:r="http://schemas.openxmlformats.org/officeDocument/2006/relationships" xmlns:p="http://schemas.openxmlformats.org/presentationml/2006/main">
   <p:cSld>
     <p:spTree>
@@ -4889,107 +5027,7 @@
 </p:sld>
 </file>
 
-<file path=ppt/slides/slide2.xml><?xml version="1.0" encoding="utf-8"?>
-<p:sld xmlns:a="http://schemas.openxmlformats.org/drawingml/2006/main" xmlns:r="http://schemas.openxmlformats.org/officeDocument/2006/relationships" xmlns:p="http://schemas.openxmlformats.org/presentationml/2006/main">
-  <p:cSld>
-    <p:spTree>
-      <p:nvGrpSpPr>
-        <p:cNvPr id="1" name=""/>
-        <p:cNvGrpSpPr/>
-        <p:nvPr/>
-      </p:nvGrpSpPr>
-      <p:grpSpPr>
-        <a:xfrm>
-          <a:off x="0" y="0"/>
-          <a:ext cx="0" cy="0"/>
-          <a:chOff x="0" y="0"/>
-          <a:chExt cx="0" cy="0"/>
-        </a:xfrm>
-      </p:grpSpPr>
-      <p:sp>
-        <p:nvSpPr>
-          <p:cNvPr id="2" name="Title 1"/>
-          <p:cNvSpPr>
-            <a:spLocks noGrp="1"/>
-          </p:cNvSpPr>
-          <p:nvPr>
-            <p:ph type="title"/>
-          </p:nvPr>
-        </p:nvSpPr>
-        <p:spPr/>
-        <p:txBody>
-          <a:bodyPr/>
-          <a:lstStyle/>
-          <a:p>
-            <a:r>
-              <a:rPr lang="en-US" dirty="0" smtClean="0"/>
-              <a:t>Course Basics</a:t>
-            </a:r>
-            <a:endParaRPr lang="en-US" dirty="0"/>
-          </a:p>
-        </p:txBody>
-      </p:sp>
-      <p:sp>
-        <p:nvSpPr>
-          <p:cNvPr id="3" name="Content Placeholder 2"/>
-          <p:cNvSpPr>
-            <a:spLocks noGrp="1"/>
-          </p:cNvSpPr>
-          <p:nvPr>
-            <p:ph idx="1"/>
-          </p:nvPr>
-        </p:nvSpPr>
-        <p:spPr/>
-        <p:txBody>
-          <a:bodyPr/>
-          <a:lstStyle/>
-          <a:p>
-            <a:r>
-              <a:rPr lang="en-US" dirty="0" smtClean="0"/>
-              <a:t>5 lab days: ~30min background, 2.5h lab</a:t>
-            </a:r>
-          </a:p>
-          <a:p>
-            <a:r>
-              <a:rPr lang="en-US" dirty="0" smtClean="0"/>
-              <a:t>1 presentation madness day</a:t>
-            </a:r>
-          </a:p>
-          <a:p>
-            <a:r>
-              <a:rPr lang="en-US" dirty="0" smtClean="0"/>
-              <a:t>No grades</a:t>
-            </a:r>
-          </a:p>
-          <a:p>
-            <a:r>
-              <a:rPr lang="en-US" dirty="0" smtClean="0"/>
-              <a:t>No homework, unless you don’t finish lab</a:t>
-            </a:r>
-          </a:p>
-        </p:txBody>
-      </p:sp>
-    </p:spTree>
-    <p:extLst>
-      <p:ext uri="{BB962C8B-B14F-4D97-AF65-F5344CB8AC3E}">
-        <p14:creationId xmlns:p14="http://schemas.microsoft.com/office/powerpoint/2010/main" val="2589989488"/>
-      </p:ext>
-    </p:extLst>
-  </p:cSld>
-  <p:clrMapOvr>
-    <a:masterClrMapping/>
-  </p:clrMapOvr>
-  <p:timing>
-    <p:tnLst>
-      <p:par>
-        <p:cTn xmlns:p14="http://schemas.microsoft.com/office/powerpoint/2010/main" id="1" dur="indefinite" restart="never" nodeType="tmRoot"/>
-      </p:par>
-    </p:tnLst>
-  </p:timing>
-</p:sld>
-</file>
-
-<file path=ppt/slides/slide20.xml><?xml version="1.0" encoding="utf-8"?>
+<file path=ppt/slides/slide21.xml><?xml version="1.0" encoding="utf-8"?>
 <p:sld xmlns:a="http://schemas.openxmlformats.org/drawingml/2006/main" xmlns:r="http://schemas.openxmlformats.org/officeDocument/2006/relationships" xmlns:p="http://schemas.openxmlformats.org/presentationml/2006/main">
   <p:cSld>
     <p:spTree>
@@ -5685,11 +5723,7 @@
             <a:pPr algn="ctr"/>
             <a:r>
               <a:rPr lang="en-US" sz="4000" dirty="0" smtClean="0"/>
-              <a:t>Why </a:t>
-            </a:r>
-            <a:r>
-              <a:rPr lang="en-US" sz="4000" dirty="0" smtClean="0"/>
-              <a:t>is this important?</a:t>
+              <a:t>Why is this important?</a:t>
             </a:r>
             <a:endParaRPr lang="en-US" sz="4000" dirty="0"/>
           </a:p>

</xml_diff>